<commit_message>
add register and update ppt
</commit_message>
<xml_diff>
--- a/file/休闲生活后台service答辩.pptx
+++ b/file/休闲生活后台service答辩.pptx
@@ -4306,19 +4306,7 @@
                 <a:latin typeface="微软雅黑" panose="020B0503020204020204" pitchFamily="34" charset="-122"/>
                 <a:ea typeface="微软雅黑" panose="020B0503020204020204" pitchFamily="34" charset="-122"/>
               </a:rPr>
-              <a:t>：</a:t>
-            </a:r>
-            <a:r>
-              <a:rPr lang="en-US" altLang="zh-CN" sz="1600" dirty="0" smtClean="0">
-                <a:solidFill>
-                  <a:schemeClr val="bg1">
-                    <a:lumMod val="95000"/>
-                  </a:schemeClr>
-                </a:solidFill>
-                <a:latin typeface="微软雅黑" panose="020B0503020204020204" pitchFamily="34" charset="-122"/>
-                <a:ea typeface="微软雅黑" panose="020B0503020204020204" pitchFamily="34" charset="-122"/>
-              </a:rPr>
-              <a:t>XXX</a:t>
+              <a:t>：陶安</a:t>
             </a:r>
             <a:endParaRPr lang="en-US" altLang="zh-CN" sz="1600" dirty="0" smtClean="0">
               <a:solidFill>
@@ -21287,7 +21275,7 @@
         <p:spPr>
           <a:xfrm>
             <a:off x="7729326" y="2109045"/>
-            <a:ext cx="2398522" cy="650240"/>
+            <a:ext cx="2398522" cy="370840"/>
           </a:xfrm>
           <a:prstGeom prst="rect">
             <a:avLst/>
@@ -21306,6 +21294,30 @@
               </a:lnSpc>
             </a:pPr>
             <a:r>
+              <a:rPr lang="zh-CN" sz="1400" dirty="0" smtClean="0">
+                <a:solidFill>
+                  <a:schemeClr val="bg1">
+                    <a:lumMod val="95000"/>
+                  </a:schemeClr>
+                </a:solidFill>
+                <a:latin typeface="微软雅黑" panose="020B0503020204020204" pitchFamily="34" charset="-122"/>
+                <a:ea typeface="微软雅黑" panose="020B0503020204020204" pitchFamily="34" charset="-122"/>
+              </a:rPr>
+              <a:t>使用</a:t>
+            </a:r>
+            <a:r>
+              <a:rPr lang="en-US" altLang="zh-CN" sz="1400" dirty="0" smtClean="0">
+                <a:solidFill>
+                  <a:schemeClr val="bg1">
+                    <a:lumMod val="95000"/>
+                  </a:schemeClr>
+                </a:solidFill>
+                <a:latin typeface="微软雅黑" panose="020B0503020204020204" pitchFamily="34" charset="-122"/>
+                <a:ea typeface="微软雅黑" panose="020B0503020204020204" pitchFamily="34" charset="-122"/>
+              </a:rPr>
+              <a:t>gson</a:t>
+            </a:r>
+            <a:r>
               <a:rPr lang="zh-CN" altLang="en-US" sz="1400" dirty="0" smtClean="0">
                 <a:solidFill>
                   <a:schemeClr val="bg1">
@@ -21315,19 +21327,7 @@
                 <a:latin typeface="微软雅黑" panose="020B0503020204020204" pitchFamily="34" charset="-122"/>
                 <a:ea typeface="微软雅黑" panose="020B0503020204020204" pitchFamily="34" charset="-122"/>
               </a:rPr>
-              <a:t>编写</a:t>
-            </a:r>
-            <a:r>
-              <a:rPr lang="en-US" altLang="zh-CN" sz="1400" dirty="0" smtClean="0">
-                <a:solidFill>
-                  <a:schemeClr val="bg1">
-                    <a:lumMod val="95000"/>
-                  </a:schemeClr>
-                </a:solidFill>
-                <a:latin typeface="微软雅黑" panose="020B0503020204020204" pitchFamily="34" charset="-122"/>
-                <a:ea typeface="微软雅黑" panose="020B0503020204020204" pitchFamily="34" charset="-122"/>
-              </a:rPr>
-              <a:t>ConvertToJson</a:t>
+              <a:t>处理集合类字符串</a:t>
             </a:r>
             <a:r>
               <a:rPr lang="zh-CN" altLang="en-US" sz="1400" dirty="0" smtClean="0">
@@ -21339,31 +21339,7 @@
                 <a:latin typeface="微软雅黑" panose="020B0503020204020204" pitchFamily="34" charset="-122"/>
                 <a:ea typeface="微软雅黑" panose="020B0503020204020204" pitchFamily="34" charset="-122"/>
               </a:rPr>
-              <a:t>工具类结合</a:t>
-            </a:r>
-            <a:r>
-              <a:rPr lang="en-US" altLang="zh-CN" sz="1400" dirty="0" smtClean="0">
-                <a:solidFill>
-                  <a:schemeClr val="bg1">
-                    <a:lumMod val="95000"/>
-                  </a:schemeClr>
-                </a:solidFill>
-                <a:latin typeface="微软雅黑" panose="020B0503020204020204" pitchFamily="34" charset="-122"/>
-                <a:ea typeface="微软雅黑" panose="020B0503020204020204" pitchFamily="34" charset="-122"/>
-              </a:rPr>
-              <a:t>fastJson</a:t>
-            </a:r>
-            <a:r>
-              <a:rPr lang="zh-CN" altLang="en-US" sz="1400" dirty="0" smtClean="0">
-                <a:solidFill>
-                  <a:schemeClr val="bg1">
-                    <a:lumMod val="95000"/>
-                  </a:schemeClr>
-                </a:solidFill>
-                <a:latin typeface="微软雅黑" panose="020B0503020204020204" pitchFamily="34" charset="-122"/>
-                <a:ea typeface="微软雅黑" panose="020B0503020204020204" pitchFamily="34" charset="-122"/>
-              </a:rPr>
-              <a:t>处理。</a:t>
+              <a:t>。</a:t>
             </a:r>
             <a:endParaRPr lang="zh-CN" altLang="en-US" sz="1400" dirty="0" smtClean="0">
               <a:solidFill>
@@ -27007,14 +26983,14 @@
           <a:p>
             <a:pPr algn="r"/>
             <a:r>
-              <a:rPr lang="zh-CN" altLang="en-US" sz="2000" b="1" dirty="0" smtClean="0">
+              <a:rPr lang="en-US" altLang="zh-CN" sz="2000" b="1" dirty="0" smtClean="0">
                 <a:solidFill>
                   <a:srgbClr val="ED4022"/>
                 </a:solidFill>
                 <a:latin typeface="微软雅黑" panose="020B0503020204020204" pitchFamily="34" charset="-122"/>
                 <a:ea typeface="微软雅黑" panose="020B0503020204020204" pitchFamily="34" charset="-122"/>
               </a:rPr>
-              <a:t>ConvertToJson类</a:t>
+              <a:t>gson</a:t>
             </a:r>
             <a:endParaRPr lang="zh-CN" altLang="en-US" sz="2000" b="1" dirty="0" smtClean="0">
               <a:solidFill>
@@ -28466,7 +28442,7 @@
         <p:spPr>
           <a:xfrm>
             <a:off x="1387399" y="5346227"/>
-            <a:ext cx="2424892" cy="652486"/>
+            <a:ext cx="2424892" cy="929640"/>
           </a:xfrm>
           <a:prstGeom prst="rect">
             <a:avLst/>
@@ -28486,18 +28462,18 @@
               </a:lnSpc>
             </a:pPr>
             <a:r>
-              <a:rPr lang="zh-CN" altLang="en-US" sz="1400" dirty="0" smtClean="0">
-                <a:solidFill>
-                  <a:schemeClr val="bg1">
-                    <a:lumMod val="95000"/>
-                  </a:schemeClr>
-                </a:solidFill>
-                <a:latin typeface="微软雅黑" panose="020B0503020204020204" pitchFamily="34" charset="-122"/>
-                <a:ea typeface="微软雅黑" panose="020B0503020204020204" pitchFamily="34" charset="-122"/>
-              </a:rPr>
-              <a:t>请在此添加文字说明，编辑文字。</a:t>
-            </a:r>
-            <a:endParaRPr lang="en-US" altLang="zh-CN" sz="1400" dirty="0">
+              <a:rPr lang="zh-CN" altLang="en-US" sz="1400" dirty="0">
+                <a:solidFill>
+                  <a:schemeClr val="bg1">
+                    <a:lumMod val="95000"/>
+                  </a:schemeClr>
+                </a:solidFill>
+                <a:latin typeface="微软雅黑" panose="020B0503020204020204" pitchFamily="34" charset="-122"/>
+                <a:ea typeface="微软雅黑" panose="020B0503020204020204" pitchFamily="34" charset="-122"/>
+              </a:rPr>
+              <a:t>有京剧和话剧两种分别有列表和详情显示。从数据库中获取</a:t>
+            </a:r>
+            <a:endParaRPr lang="zh-CN" altLang="en-US" sz="1400" dirty="0">
               <a:solidFill>
                 <a:schemeClr val="bg1">
                   <a:lumMod val="95000"/>
@@ -28850,7 +28826,7 @@
         <p:spPr>
           <a:xfrm>
             <a:off x="8383461" y="5346227"/>
-            <a:ext cx="2424892" cy="652486"/>
+            <a:ext cx="2424892" cy="650240"/>
           </a:xfrm>
           <a:prstGeom prst="rect">
             <a:avLst/>
@@ -28870,18 +28846,18 @@
               </a:lnSpc>
             </a:pPr>
             <a:r>
-              <a:rPr lang="zh-CN" altLang="en-US" sz="1400" dirty="0" smtClean="0">
-                <a:solidFill>
-                  <a:schemeClr val="bg1">
-                    <a:lumMod val="95000"/>
-                  </a:schemeClr>
-                </a:solidFill>
-                <a:latin typeface="微软雅黑" panose="020B0503020204020204" pitchFamily="34" charset="-122"/>
-                <a:ea typeface="微软雅黑" panose="020B0503020204020204" pitchFamily="34" charset="-122"/>
-              </a:rPr>
-              <a:t>请在此添加文字说明，编辑文字。</a:t>
-            </a:r>
-            <a:endParaRPr lang="en-US" altLang="zh-CN" sz="1400" dirty="0">
+              <a:rPr lang="zh-CN" altLang="en-US" sz="1400" dirty="0">
+                <a:solidFill>
+                  <a:schemeClr val="bg1">
+                    <a:lumMod val="95000"/>
+                  </a:schemeClr>
+                </a:solidFill>
+                <a:latin typeface="微软雅黑" panose="020B0503020204020204" pitchFamily="34" charset="-122"/>
+                <a:ea typeface="微软雅黑" panose="020B0503020204020204" pitchFamily="34" charset="-122"/>
+              </a:rPr>
+              <a:t>有美食列表，详情，还有评论，详情连接了两张表结构。</a:t>
+            </a:r>
+            <a:endParaRPr lang="zh-CN" altLang="en-US" sz="1400" dirty="0">
               <a:solidFill>
                 <a:schemeClr val="bg1">
                   <a:lumMod val="95000"/>

</xml_diff>